<commit_message>
Konuguu 1 , Konuguu 2 koshuldu
</commit_message>
<xml_diff>
--- a/media/4-Amal-intro.pptx
+++ b/media/4-Amal-intro.pptx
@@ -311,7 +311,7 @@
             <a:fld id="{11A6662E-FAF4-44BC-88B5-85A7CBFB6D30}" type="datetime1">
               <a:rPr lang="en-US" smtClean="0"/>
               <a:pPr/>
-              <a:t>8/27/2023</a:t>
+              <a:t>9/20/2023</a:t>
             </a:fld>
             <a:endParaRPr lang="en-US" dirty="0"/>
           </a:p>
@@ -516,7 +516,7 @@
           <a:p>
             <a:fld id="{4C559632-1575-4E14-B53B-3DC3D5ED3947}" type="datetime1">
               <a:rPr lang="en-US" smtClean="0"/>
-              <a:t>8/27/2023</a:t>
+              <a:t>9/20/2023</a:t>
             </a:fld>
             <a:endParaRPr lang="en-US"/>
           </a:p>
@@ -724,7 +724,7 @@
           <a:p>
             <a:fld id="{CC4A6868-2568-4CC9-B302-F37117B01A6E}" type="datetime1">
               <a:rPr lang="en-US" smtClean="0"/>
-              <a:t>8/27/2023</a:t>
+              <a:t>9/20/2023</a:t>
             </a:fld>
             <a:endParaRPr lang="en-US"/>
           </a:p>
@@ -883,7 +883,7 @@
           <a:p>
             <a:fld id="{0055F08A-1E71-4B2B-BB49-E743F2903911}" type="datetime1">
               <a:rPr lang="en-US" smtClean="0"/>
-              <a:t>8/27/2023</a:t>
+              <a:t>9/20/2023</a:t>
             </a:fld>
             <a:endParaRPr lang="en-US" dirty="0"/>
           </a:p>
@@ -1030,7 +1030,7 @@
           <a:p>
             <a:fld id="{0055F08A-1E71-4B2B-BB49-E743F2903911}" type="datetime1">
               <a:rPr lang="en-US" smtClean="0"/>
-              <a:t>8/27/2023</a:t>
+              <a:t>9/20/2023</a:t>
             </a:fld>
             <a:endParaRPr lang="en-US" dirty="0"/>
           </a:p>
@@ -1177,7 +1177,7 @@
           <a:p>
             <a:fld id="{0055F08A-1E71-4B2B-BB49-E743F2903911}" type="datetime1">
               <a:rPr lang="en-US" smtClean="0"/>
-              <a:t>8/27/2023</a:t>
+              <a:t>9/20/2023</a:t>
             </a:fld>
             <a:endParaRPr lang="en-US" dirty="0"/>
           </a:p>
@@ -1324,7 +1324,7 @@
           <a:p>
             <a:fld id="{0055F08A-1E71-4B2B-BB49-E743F2903911}" type="datetime1">
               <a:rPr lang="en-US" smtClean="0"/>
-              <a:t>8/27/2023</a:t>
+              <a:t>9/20/2023</a:t>
             </a:fld>
             <a:endParaRPr lang="en-US" dirty="0"/>
           </a:p>
@@ -1471,7 +1471,7 @@
           <a:p>
             <a:fld id="{0055F08A-1E71-4B2B-BB49-E743F2903911}" type="datetime1">
               <a:rPr lang="en-US" smtClean="0"/>
-              <a:t>8/27/2023</a:t>
+              <a:t>9/20/2023</a:t>
             </a:fld>
             <a:endParaRPr lang="en-US" dirty="0"/>
           </a:p>
@@ -1618,7 +1618,7 @@
           <a:p>
             <a:fld id="{0055F08A-1E71-4B2B-BB49-E743F2903911}" type="datetime1">
               <a:rPr lang="en-US" smtClean="0"/>
-              <a:t>8/27/2023</a:t>
+              <a:t>9/20/2023</a:t>
             </a:fld>
             <a:endParaRPr lang="en-US" dirty="0"/>
           </a:p>
@@ -1765,7 +1765,7 @@
           <a:p>
             <a:fld id="{0055F08A-1E71-4B2B-BB49-E743F2903911}" type="datetime1">
               <a:rPr lang="en-US" smtClean="0"/>
-              <a:t>8/27/2023</a:t>
+              <a:t>9/20/2023</a:t>
             </a:fld>
             <a:endParaRPr lang="en-US" dirty="0"/>
           </a:p>
@@ -1912,7 +1912,7 @@
           <a:p>
             <a:fld id="{0055F08A-1E71-4B2B-BB49-E743F2903911}" type="datetime1">
               <a:rPr lang="en-US" smtClean="0"/>
-              <a:t>8/27/2023</a:t>
+              <a:t>9/20/2023</a:t>
             </a:fld>
             <a:endParaRPr lang="en-US" dirty="0"/>
           </a:p>
@@ -2099,7 +2099,7 @@
             <a:fld id="{57E0CF6C-748E-4B7A-BC8B-3011EF78ED13}" type="datetime1">
               <a:rPr lang="en-US" smtClean="0"/>
               <a:pPr/>
-              <a:t>8/27/2023</a:t>
+              <a:t>9/20/2023</a:t>
             </a:fld>
             <a:endParaRPr lang="en-US" dirty="0"/>
           </a:p>
@@ -2266,7 +2266,7 @@
           <a:p>
             <a:fld id="{0055F08A-1E71-4B2B-BB49-E743F2903911}" type="datetime1">
               <a:rPr lang="en-US" smtClean="0"/>
-              <a:t>8/27/2023</a:t>
+              <a:t>9/20/2023</a:t>
             </a:fld>
             <a:endParaRPr lang="en-US" dirty="0"/>
           </a:p>
@@ -2413,7 +2413,7 @@
           <a:p>
             <a:fld id="{0055F08A-1E71-4B2B-BB49-E743F2903911}" type="datetime1">
               <a:rPr lang="en-US" smtClean="0"/>
-              <a:t>8/27/2023</a:t>
+              <a:t>9/20/2023</a:t>
             </a:fld>
             <a:endParaRPr lang="en-US" dirty="0"/>
           </a:p>
@@ -2824,7 +2824,7 @@
             <a:fld id="{57E0CF6C-748E-4B7A-BC8B-3011EF78ED13}" type="datetime1">
               <a:rPr lang="en-US" smtClean="0"/>
               <a:pPr/>
-              <a:t>8/27/2023</a:t>
+              <a:t>9/20/2023</a:t>
             </a:fld>
             <a:endParaRPr lang="en-US" dirty="0"/>
           </a:p>
@@ -3097,7 +3097,7 @@
           <a:p>
             <a:fld id="{5F31DA2F-80B8-49CF-99FB-5ABCA53A607A}" type="datetime1">
               <a:rPr lang="en-US" smtClean="0"/>
-              <a:t>8/27/2023</a:t>
+              <a:t>9/20/2023</a:t>
             </a:fld>
             <a:endParaRPr lang="en-US"/>
           </a:p>
@@ -3509,7 +3509,7 @@
           <a:p>
             <a:fld id="{28852172-E6C9-4B6C-929A-A9DE3837BBF1}" type="datetime1">
               <a:rPr lang="en-US" smtClean="0"/>
-              <a:t>8/27/2023</a:t>
+              <a:t>9/20/2023</a:t>
             </a:fld>
             <a:endParaRPr lang="en-US"/>
           </a:p>
@@ -3650,7 +3650,7 @@
           <a:p>
             <a:fld id="{3AB41CFF-90C9-47B3-9DA1-F2BF8D839F7E}" type="datetime1">
               <a:rPr lang="en-US" smtClean="0"/>
-              <a:t>8/27/2023</a:t>
+              <a:t>9/20/2023</a:t>
             </a:fld>
             <a:endParaRPr lang="en-US"/>
           </a:p>
@@ -3763,7 +3763,7 @@
           <a:p>
             <a:fld id="{F06048FA-06AB-4884-A69B-986B96E68A24}" type="datetime1">
               <a:rPr lang="en-US" smtClean="0"/>
-              <a:t>8/27/2023</a:t>
+              <a:t>9/20/2023</a:t>
             </a:fld>
             <a:endParaRPr lang="en-US"/>
           </a:p>
@@ -4074,7 +4074,7 @@
           <a:p>
             <a:fld id="{50DB7ABA-0172-4F9C-889D-567164F66BCD}" type="datetime1">
               <a:rPr lang="en-US" smtClean="0"/>
-              <a:t>8/27/2023</a:t>
+              <a:t>9/20/2023</a:t>
             </a:fld>
             <a:endParaRPr lang="en-US"/>
           </a:p>
@@ -4362,7 +4362,7 @@
           <a:p>
             <a:fld id="{78AC6A5B-8AE7-4A41-B5A7-9ADC6686DC18}" type="datetime1">
               <a:rPr lang="en-US" smtClean="0"/>
-              <a:t>8/27/2023</a:t>
+              <a:t>9/20/2023</a:t>
             </a:fld>
             <a:endParaRPr lang="en-US"/>
           </a:p>
@@ -4604,7 +4604,7 @@
             <a:fld id="{57E0CF6C-748E-4B7A-BC8B-3011EF78ED13}" type="datetime1">
               <a:rPr lang="en-US" smtClean="0"/>
               <a:pPr/>
-              <a:t>8/27/2023</a:t>
+              <a:t>9/20/2023</a:t>
             </a:fld>
             <a:endParaRPr lang="en-US" dirty="0"/>
           </a:p>
@@ -5188,7 +5188,7 @@
                   <a:srgbClr val="00B0F0"/>
                 </a:solidFill>
               </a:rPr>
-              <a:t>MathKG</a:t>
+              <a:t>MathKGZ</a:t>
             </a:r>
             <a:r>
               <a:rPr lang="en-US" sz="5200" dirty="0">
@@ -5557,8 +5557,8 @@
           </a:p>
         </p:txBody>
       </p:sp>
-      <mc:AlternateContent xmlns:mc="http://schemas.openxmlformats.org/markup-compatibility/2006">
-        <mc:Choice xmlns:a14="http://schemas.microsoft.com/office/drawing/2010/main" Requires="a14">
+      <mc:AlternateContent xmlns:mc="http://schemas.openxmlformats.org/markup-compatibility/2006" xmlns:a14="http://schemas.microsoft.com/office/drawing/2010/main">
+        <mc:Choice Requires="a14">
           <p:sp>
             <p:nvSpPr>
               <p:cNvPr id="9" name="TextBox 8">
@@ -5633,7 +5633,7 @@
             </p:txBody>
           </p:sp>
         </mc:Choice>
-        <mc:Fallback>
+        <mc:Fallback xmlns="">
           <p:sp>
             <p:nvSpPr>
               <p:cNvPr id="9" name="TextBox 8">
@@ -5780,8 +5780,8 @@
           </a:p>
         </p:txBody>
       </p:sp>
-      <mc:AlternateContent xmlns:mc="http://schemas.openxmlformats.org/markup-compatibility/2006">
-        <mc:Choice xmlns:a14="http://schemas.microsoft.com/office/drawing/2010/main" Requires="a14">
+      <mc:AlternateContent xmlns:mc="http://schemas.openxmlformats.org/markup-compatibility/2006" xmlns:a14="http://schemas.microsoft.com/office/drawing/2010/main">
+        <mc:Choice Requires="a14">
           <p:sp>
             <p:nvSpPr>
               <p:cNvPr id="12" name="TextBox 11">
@@ -5856,7 +5856,7 @@
             </p:txBody>
           </p:sp>
         </mc:Choice>
-        <mc:Fallback>
+        <mc:Fallback xmlns="">
           <p:sp>
             <p:nvSpPr>
               <p:cNvPr id="12" name="TextBox 11">
@@ -5901,8 +5901,8 @@
           </p:sp>
         </mc:Fallback>
       </mc:AlternateContent>
-      <mc:AlternateContent xmlns:mc="http://schemas.openxmlformats.org/markup-compatibility/2006">
-        <mc:Choice xmlns:a14="http://schemas.microsoft.com/office/drawing/2010/main" Requires="a14">
+      <mc:AlternateContent xmlns:mc="http://schemas.openxmlformats.org/markup-compatibility/2006" xmlns:a14="http://schemas.microsoft.com/office/drawing/2010/main">
+        <mc:Choice Requires="a14">
           <p:sp>
             <p:nvSpPr>
               <p:cNvPr id="14" name="TextBox 13">
@@ -5967,7 +5967,7 @@
             </p:txBody>
           </p:sp>
         </mc:Choice>
-        <mc:Fallback>
+        <mc:Fallback xmlns="">
           <p:sp>
             <p:nvSpPr>
               <p:cNvPr id="14" name="TextBox 13">
@@ -6012,8 +6012,8 @@
           </p:sp>
         </mc:Fallback>
       </mc:AlternateContent>
-      <mc:AlternateContent xmlns:mc="http://schemas.openxmlformats.org/markup-compatibility/2006">
-        <mc:Choice xmlns:a14="http://schemas.microsoft.com/office/drawing/2010/main" Requires="a14">
+      <mc:AlternateContent xmlns:mc="http://schemas.openxmlformats.org/markup-compatibility/2006" xmlns:a14="http://schemas.microsoft.com/office/drawing/2010/main">
+        <mc:Choice Requires="a14">
           <p:sp>
             <p:nvSpPr>
               <p:cNvPr id="15" name="TextBox 14">
@@ -6070,7 +6070,7 @@
             </p:txBody>
           </p:sp>
         </mc:Choice>
-        <mc:Fallback>
+        <mc:Fallback xmlns="">
           <p:sp>
             <p:nvSpPr>
               <p:cNvPr id="15" name="TextBox 14">
@@ -6474,8 +6474,8 @@
           </p:sp>
         </mc:Fallback>
       </mc:AlternateContent>
-      <mc:AlternateContent xmlns:mc="http://schemas.openxmlformats.org/markup-compatibility/2006">
-        <mc:Choice xmlns:a14="http://schemas.microsoft.com/office/drawing/2010/main" Requires="a14">
+      <mc:AlternateContent xmlns:mc="http://schemas.openxmlformats.org/markup-compatibility/2006" xmlns:a14="http://schemas.microsoft.com/office/drawing/2010/main">
+        <mc:Choice Requires="a14">
           <p:sp>
             <p:nvSpPr>
               <p:cNvPr id="3" name="TextBox 2">
@@ -6532,7 +6532,7 @@
             </p:txBody>
           </p:sp>
         </mc:Choice>
-        <mc:Fallback>
+        <mc:Fallback xmlns="">
           <p:sp>
             <p:nvSpPr>
               <p:cNvPr id="3" name="TextBox 2">
@@ -7362,8 +7362,8 @@
           </a:p>
         </p:txBody>
       </p:sp>
-      <mc:AlternateContent xmlns:mc="http://schemas.openxmlformats.org/markup-compatibility/2006">
-        <mc:Choice xmlns:a14="http://schemas.microsoft.com/office/drawing/2010/main" Requires="a14">
+      <mc:AlternateContent xmlns:mc="http://schemas.openxmlformats.org/markup-compatibility/2006" xmlns:a14="http://schemas.microsoft.com/office/drawing/2010/main">
+        <mc:Choice Requires="a14">
           <p:sp>
             <p:nvSpPr>
               <p:cNvPr id="9" name="TextBox 8">
@@ -7438,7 +7438,7 @@
             </p:txBody>
           </p:sp>
         </mc:Choice>
-        <mc:Fallback>
+        <mc:Fallback xmlns="">
           <p:sp>
             <p:nvSpPr>
               <p:cNvPr id="9" name="TextBox 8">
@@ -7585,8 +7585,8 @@
           </a:p>
         </p:txBody>
       </p:sp>
-      <mc:AlternateContent xmlns:mc="http://schemas.openxmlformats.org/markup-compatibility/2006">
-        <mc:Choice xmlns:a14="http://schemas.microsoft.com/office/drawing/2010/main" Requires="a14">
+      <mc:AlternateContent xmlns:mc="http://schemas.openxmlformats.org/markup-compatibility/2006" xmlns:a14="http://schemas.microsoft.com/office/drawing/2010/main">
+        <mc:Choice Requires="a14">
           <p:sp>
             <p:nvSpPr>
               <p:cNvPr id="12" name="TextBox 11">
@@ -7661,7 +7661,7 @@
             </p:txBody>
           </p:sp>
         </mc:Choice>
-        <mc:Fallback>
+        <mc:Fallback xmlns="">
           <p:sp>
             <p:nvSpPr>
               <p:cNvPr id="12" name="TextBox 11">
@@ -8065,8 +8065,8 @@
           </p:sp>
         </mc:Fallback>
       </mc:AlternateContent>
-      <mc:AlternateContent xmlns:mc="http://schemas.openxmlformats.org/markup-compatibility/2006">
-        <mc:Choice xmlns:a14="http://schemas.microsoft.com/office/drawing/2010/main" Requires="a14">
+      <mc:AlternateContent xmlns:mc="http://schemas.openxmlformats.org/markup-compatibility/2006" xmlns:a14="http://schemas.microsoft.com/office/drawing/2010/main">
+        <mc:Choice Requires="a14">
           <p:sp>
             <p:nvSpPr>
               <p:cNvPr id="22" name="TextBox 21">
@@ -8141,7 +8141,7 @@
             </p:txBody>
           </p:sp>
         </mc:Choice>
-        <mc:Fallback>
+        <mc:Fallback xmlns="">
           <p:sp>
             <p:nvSpPr>
               <p:cNvPr id="22" name="TextBox 21">
@@ -8385,8 +8385,8 @@
           </p:sp>
         </mc:Fallback>
       </mc:AlternateContent>
-      <mc:AlternateContent xmlns:mc="http://schemas.openxmlformats.org/markup-compatibility/2006">
-        <mc:Choice xmlns:a14="http://schemas.microsoft.com/office/drawing/2010/main" Requires="a14">
+      <mc:AlternateContent xmlns:mc="http://schemas.openxmlformats.org/markup-compatibility/2006" xmlns:a14="http://schemas.microsoft.com/office/drawing/2010/main">
+        <mc:Choice Requires="a14">
           <p:sp>
             <p:nvSpPr>
               <p:cNvPr id="29" name="TextBox 28">
@@ -8443,7 +8443,7 @@
             </p:txBody>
           </p:sp>
         </mc:Choice>
-        <mc:Fallback>
+        <mc:Fallback xmlns="">
           <p:sp>
             <p:nvSpPr>
               <p:cNvPr id="29" name="TextBox 28">
@@ -9327,8 +9327,8 @@
           </a:p>
         </p:txBody>
       </p:sp>
-      <mc:AlternateContent xmlns:mc="http://schemas.openxmlformats.org/markup-compatibility/2006">
-        <mc:Choice xmlns:a14="http://schemas.microsoft.com/office/drawing/2010/main" Requires="a14">
+      <mc:AlternateContent xmlns:mc="http://schemas.openxmlformats.org/markup-compatibility/2006" xmlns:a14="http://schemas.microsoft.com/office/drawing/2010/main">
+        <mc:Choice Requires="a14">
           <p:sp>
             <p:nvSpPr>
               <p:cNvPr id="9" name="TextBox 8">
@@ -9403,7 +9403,7 @@
             </p:txBody>
           </p:sp>
         </mc:Choice>
-        <mc:Fallback>
+        <mc:Fallback xmlns="">
           <p:sp>
             <p:nvSpPr>
               <p:cNvPr id="9" name="TextBox 8">
@@ -9550,8 +9550,8 @@
           </a:p>
         </p:txBody>
       </p:sp>
-      <mc:AlternateContent xmlns:mc="http://schemas.openxmlformats.org/markup-compatibility/2006">
-        <mc:Choice xmlns:a14="http://schemas.microsoft.com/office/drawing/2010/main" Requires="a14">
+      <mc:AlternateContent xmlns:mc="http://schemas.openxmlformats.org/markup-compatibility/2006" xmlns:a14="http://schemas.microsoft.com/office/drawing/2010/main">
+        <mc:Choice Requires="a14">
           <p:sp>
             <p:nvSpPr>
               <p:cNvPr id="12" name="TextBox 11">
@@ -9626,7 +9626,7 @@
             </p:txBody>
           </p:sp>
         </mc:Choice>
-        <mc:Fallback>
+        <mc:Fallback xmlns="">
           <p:sp>
             <p:nvSpPr>
               <p:cNvPr id="12" name="TextBox 11">
@@ -10030,8 +10030,8 @@
           </p:sp>
         </mc:Fallback>
       </mc:AlternateContent>
-      <mc:AlternateContent xmlns:mc="http://schemas.openxmlformats.org/markup-compatibility/2006">
-        <mc:Choice xmlns:a14="http://schemas.microsoft.com/office/drawing/2010/main" Requires="a14">
+      <mc:AlternateContent xmlns:mc="http://schemas.openxmlformats.org/markup-compatibility/2006" xmlns:a14="http://schemas.microsoft.com/office/drawing/2010/main">
+        <mc:Choice Requires="a14">
           <p:sp>
             <p:nvSpPr>
               <p:cNvPr id="3" name="TextBox 2">
@@ -10088,7 +10088,7 @@
             </p:txBody>
           </p:sp>
         </mc:Choice>
-        <mc:Fallback>
+        <mc:Fallback xmlns="">
           <p:sp>
             <p:nvSpPr>
               <p:cNvPr id="3" name="TextBox 2">
@@ -10133,8 +10133,8 @@
           </p:sp>
         </mc:Fallback>
       </mc:AlternateContent>
-      <mc:AlternateContent xmlns:mc="http://schemas.openxmlformats.org/markup-compatibility/2006">
-        <mc:Choice xmlns:a14="http://schemas.microsoft.com/office/drawing/2010/main" Requires="a14">
+      <mc:AlternateContent xmlns:mc="http://schemas.openxmlformats.org/markup-compatibility/2006" xmlns:a14="http://schemas.microsoft.com/office/drawing/2010/main">
+        <mc:Choice Requires="a14">
           <p:sp>
             <p:nvSpPr>
               <p:cNvPr id="22" name="TextBox 21">
@@ -10191,7 +10191,7 @@
             </p:txBody>
           </p:sp>
         </mc:Choice>
-        <mc:Fallback>
+        <mc:Fallback xmlns="">
           <p:sp>
             <p:nvSpPr>
               <p:cNvPr id="22" name="TextBox 21">
@@ -10236,8 +10236,8 @@
           </p:sp>
         </mc:Fallback>
       </mc:AlternateContent>
-      <mc:AlternateContent xmlns:mc="http://schemas.openxmlformats.org/markup-compatibility/2006">
-        <mc:Choice xmlns:a14="http://schemas.microsoft.com/office/drawing/2010/main" Requires="a14">
+      <mc:AlternateContent xmlns:mc="http://schemas.openxmlformats.org/markup-compatibility/2006" xmlns:a14="http://schemas.microsoft.com/office/drawing/2010/main">
+        <mc:Choice Requires="a14">
           <p:sp>
             <p:nvSpPr>
               <p:cNvPr id="23" name="TextBox 22">
@@ -10294,7 +10294,7 @@
             </p:txBody>
           </p:sp>
         </mc:Choice>
-        <mc:Fallback>
+        <mc:Fallback xmlns="">
           <p:sp>
             <p:nvSpPr>
               <p:cNvPr id="23" name="TextBox 22">
@@ -11011,8 +11011,8 @@
           </a:p>
         </p:txBody>
       </p:sp>
-      <mc:AlternateContent xmlns:mc="http://schemas.openxmlformats.org/markup-compatibility/2006">
-        <mc:Choice xmlns:a14="http://schemas.microsoft.com/office/drawing/2010/main" Requires="a14">
+      <mc:AlternateContent xmlns:mc="http://schemas.openxmlformats.org/markup-compatibility/2006" xmlns:a14="http://schemas.microsoft.com/office/drawing/2010/main">
+        <mc:Choice Requires="a14">
           <p:sp>
             <p:nvSpPr>
               <p:cNvPr id="6" name="TextBox 5">
@@ -11080,7 +11080,7 @@
             </p:txBody>
           </p:sp>
         </mc:Choice>
-        <mc:Fallback>
+        <mc:Fallback xmlns="">
           <p:sp>
             <p:nvSpPr>
               <p:cNvPr id="6" name="TextBox 5">
@@ -11227,8 +11227,8 @@
           </a:p>
         </p:txBody>
       </p:sp>
-      <mc:AlternateContent xmlns:mc="http://schemas.openxmlformats.org/markup-compatibility/2006">
-        <mc:Choice xmlns:a14="http://schemas.microsoft.com/office/drawing/2010/main" Requires="a14">
+      <mc:AlternateContent xmlns:mc="http://schemas.openxmlformats.org/markup-compatibility/2006" xmlns:a14="http://schemas.microsoft.com/office/drawing/2010/main">
+        <mc:Choice Requires="a14">
           <p:sp>
             <p:nvSpPr>
               <p:cNvPr id="9" name="TextBox 8">
@@ -11303,7 +11303,7 @@
             </p:txBody>
           </p:sp>
         </mc:Choice>
-        <mc:Fallback>
+        <mc:Fallback xmlns="">
           <p:sp>
             <p:nvSpPr>
               <p:cNvPr id="9" name="TextBox 8">
@@ -11450,8 +11450,8 @@
           </a:p>
         </p:txBody>
       </p:sp>
-      <mc:AlternateContent xmlns:mc="http://schemas.openxmlformats.org/markup-compatibility/2006">
-        <mc:Choice xmlns:a14="http://schemas.microsoft.com/office/drawing/2010/main" Requires="a14">
+      <mc:AlternateContent xmlns:mc="http://schemas.openxmlformats.org/markup-compatibility/2006" xmlns:a14="http://schemas.microsoft.com/office/drawing/2010/main">
+        <mc:Choice Requires="a14">
           <p:sp>
             <p:nvSpPr>
               <p:cNvPr id="12" name="TextBox 11">
@@ -11526,7 +11526,7 @@
             </p:txBody>
           </p:sp>
         </mc:Choice>
-        <mc:Fallback>
+        <mc:Fallback xmlns="">
           <p:sp>
             <p:nvSpPr>
               <p:cNvPr id="12" name="TextBox 11">
@@ -11662,8 +11662,8 @@
           </a:p>
         </p:txBody>
       </p:sp>
-      <mc:AlternateContent xmlns:mc="http://schemas.openxmlformats.org/markup-compatibility/2006">
-        <mc:Choice xmlns:a14="http://schemas.microsoft.com/office/drawing/2010/main" Requires="a14">
+      <mc:AlternateContent xmlns:mc="http://schemas.openxmlformats.org/markup-compatibility/2006" xmlns:a14="http://schemas.microsoft.com/office/drawing/2010/main">
+        <mc:Choice Requires="a14">
           <p:sp>
             <p:nvSpPr>
               <p:cNvPr id="3" name="TextBox 2">
@@ -11713,7 +11713,7 @@
             </p:txBody>
           </p:sp>
         </mc:Choice>
-        <mc:Fallback>
+        <mc:Fallback xmlns="">
           <p:sp>
             <p:nvSpPr>
               <p:cNvPr id="3" name="TextBox 2">
@@ -11758,8 +11758,8 @@
           </p:sp>
         </mc:Fallback>
       </mc:AlternateContent>
-      <mc:AlternateContent xmlns:mc="http://schemas.openxmlformats.org/markup-compatibility/2006">
-        <mc:Choice xmlns:a14="http://schemas.microsoft.com/office/drawing/2010/main" Requires="a14">
+      <mc:AlternateContent xmlns:mc="http://schemas.openxmlformats.org/markup-compatibility/2006" xmlns:a14="http://schemas.microsoft.com/office/drawing/2010/main">
+        <mc:Choice Requires="a14">
           <p:sp>
             <p:nvSpPr>
               <p:cNvPr id="22" name="TextBox 21">
@@ -11821,7 +11821,7 @@
             </p:txBody>
           </p:sp>
         </mc:Choice>
-        <mc:Fallback>
+        <mc:Fallback xmlns="">
           <p:sp>
             <p:nvSpPr>
               <p:cNvPr id="22" name="TextBox 21">
@@ -11866,8 +11866,8 @@
           </p:sp>
         </mc:Fallback>
       </mc:AlternateContent>
-      <mc:AlternateContent xmlns:mc="http://schemas.openxmlformats.org/markup-compatibility/2006">
-        <mc:Choice xmlns:a14="http://schemas.microsoft.com/office/drawing/2010/main" Requires="a14">
+      <mc:AlternateContent xmlns:mc="http://schemas.openxmlformats.org/markup-compatibility/2006" xmlns:a14="http://schemas.microsoft.com/office/drawing/2010/main">
+        <mc:Choice Requires="a14">
           <p:sp>
             <p:nvSpPr>
               <p:cNvPr id="23" name="TextBox 22">
@@ -11925,7 +11925,7 @@
             </p:txBody>
           </p:sp>
         </mc:Choice>
-        <mc:Fallback>
+        <mc:Fallback xmlns="">
           <p:sp>
             <p:nvSpPr>
               <p:cNvPr id="23" name="TextBox 22">
@@ -12498,8 +12498,8 @@
           </a:p>
         </p:txBody>
       </p:sp>
-      <mc:AlternateContent xmlns:mc="http://schemas.openxmlformats.org/markup-compatibility/2006">
-        <mc:Choice xmlns:a14="http://schemas.microsoft.com/office/drawing/2010/main" Requires="a14">
+      <mc:AlternateContent xmlns:mc="http://schemas.openxmlformats.org/markup-compatibility/2006" xmlns:a14="http://schemas.microsoft.com/office/drawing/2010/main">
+        <mc:Choice Requires="a14">
           <p:sp>
             <p:nvSpPr>
               <p:cNvPr id="6" name="TextBox 5">
@@ -12567,7 +12567,7 @@
             </p:txBody>
           </p:sp>
         </mc:Choice>
-        <mc:Fallback>
+        <mc:Fallback xmlns="">
           <p:sp>
             <p:nvSpPr>
               <p:cNvPr id="6" name="TextBox 5">
@@ -12714,8 +12714,8 @@
           </a:p>
         </p:txBody>
       </p:sp>
-      <mc:AlternateContent xmlns:mc="http://schemas.openxmlformats.org/markup-compatibility/2006">
-        <mc:Choice xmlns:a14="http://schemas.microsoft.com/office/drawing/2010/main" Requires="a14">
+      <mc:AlternateContent xmlns:mc="http://schemas.openxmlformats.org/markup-compatibility/2006" xmlns:a14="http://schemas.microsoft.com/office/drawing/2010/main">
+        <mc:Choice Requires="a14">
           <p:sp>
             <p:nvSpPr>
               <p:cNvPr id="9" name="TextBox 8">
@@ -12790,7 +12790,7 @@
             </p:txBody>
           </p:sp>
         </mc:Choice>
-        <mc:Fallback>
+        <mc:Fallback xmlns="">
           <p:sp>
             <p:nvSpPr>
               <p:cNvPr id="9" name="TextBox 8">
@@ -12937,8 +12937,8 @@
           </a:p>
         </p:txBody>
       </p:sp>
-      <mc:AlternateContent xmlns:mc="http://schemas.openxmlformats.org/markup-compatibility/2006">
-        <mc:Choice xmlns:a14="http://schemas.microsoft.com/office/drawing/2010/main" Requires="a14">
+      <mc:AlternateContent xmlns:mc="http://schemas.openxmlformats.org/markup-compatibility/2006" xmlns:a14="http://schemas.microsoft.com/office/drawing/2010/main">
+        <mc:Choice Requires="a14">
           <p:sp>
             <p:nvSpPr>
               <p:cNvPr id="12" name="TextBox 11">
@@ -13013,7 +13013,7 @@
             </p:txBody>
           </p:sp>
         </mc:Choice>
-        <mc:Fallback>
+        <mc:Fallback xmlns="">
           <p:sp>
             <p:nvSpPr>
               <p:cNvPr id="12" name="TextBox 11">
@@ -13219,8 +13219,8 @@
           </a:p>
         </p:txBody>
       </p:sp>
-      <mc:AlternateContent xmlns:mc="http://schemas.openxmlformats.org/markup-compatibility/2006">
-        <mc:Choice xmlns:a14="http://schemas.microsoft.com/office/drawing/2010/main" Requires="a14">
+      <mc:AlternateContent xmlns:mc="http://schemas.openxmlformats.org/markup-compatibility/2006" xmlns:a14="http://schemas.microsoft.com/office/drawing/2010/main">
+        <mc:Choice Requires="a14">
           <p:sp>
             <p:nvSpPr>
               <p:cNvPr id="19" name="TextBox 18">
@@ -13273,7 +13273,7 @@
             </p:txBody>
           </p:sp>
         </mc:Choice>
-        <mc:Fallback>
+        <mc:Fallback xmlns="">
           <p:sp>
             <p:nvSpPr>
               <p:cNvPr id="19" name="TextBox 18">
@@ -13318,8 +13318,8 @@
           </p:sp>
         </mc:Fallback>
       </mc:AlternateContent>
-      <mc:AlternateContent xmlns:mc="http://schemas.openxmlformats.org/markup-compatibility/2006">
-        <mc:Choice xmlns:a14="http://schemas.microsoft.com/office/drawing/2010/main" Requires="a14">
+      <mc:AlternateContent xmlns:mc="http://schemas.openxmlformats.org/markup-compatibility/2006" xmlns:a14="http://schemas.microsoft.com/office/drawing/2010/main">
+        <mc:Choice Requires="a14">
           <p:sp>
             <p:nvSpPr>
               <p:cNvPr id="20" name="TextBox 19">
@@ -13372,7 +13372,7 @@
             </p:txBody>
           </p:sp>
         </mc:Choice>
-        <mc:Fallback>
+        <mc:Fallback xmlns="">
           <p:sp>
             <p:nvSpPr>
               <p:cNvPr id="20" name="TextBox 19">
@@ -13417,8 +13417,8 @@
           </p:sp>
         </mc:Fallback>
       </mc:AlternateContent>
-      <mc:AlternateContent xmlns:mc="http://schemas.openxmlformats.org/markup-compatibility/2006">
-        <mc:Choice xmlns:a14="http://schemas.microsoft.com/office/drawing/2010/main" Requires="a14">
+      <mc:AlternateContent xmlns:mc="http://schemas.openxmlformats.org/markup-compatibility/2006" xmlns:a14="http://schemas.microsoft.com/office/drawing/2010/main">
+        <mc:Choice Requires="a14">
           <p:sp>
             <p:nvSpPr>
               <p:cNvPr id="3" name="TextBox 2">
@@ -13488,7 +13488,7 @@
             </p:txBody>
           </p:sp>
         </mc:Choice>
-        <mc:Fallback>
+        <mc:Fallback xmlns="">
           <p:sp>
             <p:nvSpPr>
               <p:cNvPr id="3" name="TextBox 2">
@@ -13533,8 +13533,8 @@
           </p:sp>
         </mc:Fallback>
       </mc:AlternateContent>
-      <mc:AlternateContent xmlns:mc="http://schemas.openxmlformats.org/markup-compatibility/2006">
-        <mc:Choice xmlns:a14="http://schemas.microsoft.com/office/drawing/2010/main" Requires="a14">
+      <mc:AlternateContent xmlns:mc="http://schemas.openxmlformats.org/markup-compatibility/2006" xmlns:a14="http://schemas.microsoft.com/office/drawing/2010/main">
+        <mc:Choice Requires="a14">
           <p:sp>
             <p:nvSpPr>
               <p:cNvPr id="22" name="TextBox 21">
@@ -13584,7 +13584,7 @@
             </p:txBody>
           </p:sp>
         </mc:Choice>
-        <mc:Fallback>
+        <mc:Fallback xmlns="">
           <p:sp>
             <p:nvSpPr>
               <p:cNvPr id="22" name="TextBox 21">
@@ -13629,8 +13629,8 @@
           </p:sp>
         </mc:Fallback>
       </mc:AlternateContent>
-      <mc:AlternateContent xmlns:mc="http://schemas.openxmlformats.org/markup-compatibility/2006">
-        <mc:Choice xmlns:a14="http://schemas.microsoft.com/office/drawing/2010/main" Requires="a14">
+      <mc:AlternateContent xmlns:mc="http://schemas.openxmlformats.org/markup-compatibility/2006" xmlns:a14="http://schemas.microsoft.com/office/drawing/2010/main">
+        <mc:Choice Requires="a14">
           <p:sp>
             <p:nvSpPr>
               <p:cNvPr id="23" name="TextBox 22">
@@ -13684,7 +13684,7 @@
             </p:txBody>
           </p:sp>
         </mc:Choice>
-        <mc:Fallback>
+        <mc:Fallback xmlns="">
           <p:sp>
             <p:nvSpPr>
               <p:cNvPr id="23" name="TextBox 22">
@@ -14401,8 +14401,8 @@
           </a:p>
         </p:txBody>
       </p:sp>
-      <mc:AlternateContent xmlns:mc="http://schemas.openxmlformats.org/markup-compatibility/2006">
-        <mc:Choice xmlns:a14="http://schemas.microsoft.com/office/drawing/2010/main" Requires="a14">
+      <mc:AlternateContent xmlns:mc="http://schemas.openxmlformats.org/markup-compatibility/2006" xmlns:a14="http://schemas.microsoft.com/office/drawing/2010/main">
+        <mc:Choice Requires="a14">
           <p:sp>
             <p:nvSpPr>
               <p:cNvPr id="6" name="TextBox 5">
@@ -14470,7 +14470,7 @@
             </p:txBody>
           </p:sp>
         </mc:Choice>
-        <mc:Fallback>
+        <mc:Fallback xmlns="">
           <p:sp>
             <p:nvSpPr>
               <p:cNvPr id="6" name="TextBox 5">
@@ -14617,8 +14617,8 @@
           </a:p>
         </p:txBody>
       </p:sp>
-      <mc:AlternateContent xmlns:mc="http://schemas.openxmlformats.org/markup-compatibility/2006">
-        <mc:Choice xmlns:a14="http://schemas.microsoft.com/office/drawing/2010/main" Requires="a14">
+      <mc:AlternateContent xmlns:mc="http://schemas.openxmlformats.org/markup-compatibility/2006" xmlns:a14="http://schemas.microsoft.com/office/drawing/2010/main">
+        <mc:Choice Requires="a14">
           <p:sp>
             <p:nvSpPr>
               <p:cNvPr id="9" name="TextBox 8">
@@ -14693,7 +14693,7 @@
             </p:txBody>
           </p:sp>
         </mc:Choice>
-        <mc:Fallback>
+        <mc:Fallback xmlns="">
           <p:sp>
             <p:nvSpPr>
               <p:cNvPr id="9" name="TextBox 8">
@@ -14840,8 +14840,8 @@
           </a:p>
         </p:txBody>
       </p:sp>
-      <mc:AlternateContent xmlns:mc="http://schemas.openxmlformats.org/markup-compatibility/2006">
-        <mc:Choice xmlns:a14="http://schemas.microsoft.com/office/drawing/2010/main" Requires="a14">
+      <mc:AlternateContent xmlns:mc="http://schemas.openxmlformats.org/markup-compatibility/2006" xmlns:a14="http://schemas.microsoft.com/office/drawing/2010/main">
+        <mc:Choice Requires="a14">
           <p:sp>
             <p:nvSpPr>
               <p:cNvPr id="12" name="TextBox 11">
@@ -14916,7 +14916,7 @@
             </p:txBody>
           </p:sp>
         </mc:Choice>
-        <mc:Fallback>
+        <mc:Fallback xmlns="">
           <p:sp>
             <p:nvSpPr>
               <p:cNvPr id="12" name="TextBox 11">
@@ -15122,8 +15122,8 @@
           </a:p>
         </p:txBody>
       </p:sp>
-      <mc:AlternateContent xmlns:mc="http://schemas.openxmlformats.org/markup-compatibility/2006">
-        <mc:Choice xmlns:a14="http://schemas.microsoft.com/office/drawing/2010/main" Requires="a14">
+      <mc:AlternateContent xmlns:mc="http://schemas.openxmlformats.org/markup-compatibility/2006" xmlns:a14="http://schemas.microsoft.com/office/drawing/2010/main">
+        <mc:Choice Requires="a14">
           <p:sp>
             <p:nvSpPr>
               <p:cNvPr id="19" name="TextBox 18">
@@ -15176,7 +15176,7 @@
             </p:txBody>
           </p:sp>
         </mc:Choice>
-        <mc:Fallback>
+        <mc:Fallback xmlns="">
           <p:sp>
             <p:nvSpPr>
               <p:cNvPr id="19" name="TextBox 18">
@@ -15221,8 +15221,8 @@
           </p:sp>
         </mc:Fallback>
       </mc:AlternateContent>
-      <mc:AlternateContent xmlns:mc="http://schemas.openxmlformats.org/markup-compatibility/2006">
-        <mc:Choice xmlns:a14="http://schemas.microsoft.com/office/drawing/2010/main" Requires="a14">
+      <mc:AlternateContent xmlns:mc="http://schemas.openxmlformats.org/markup-compatibility/2006" xmlns:a14="http://schemas.microsoft.com/office/drawing/2010/main">
+        <mc:Choice Requires="a14">
           <p:sp>
             <p:nvSpPr>
               <p:cNvPr id="20" name="TextBox 19">
@@ -15275,7 +15275,7 @@
             </p:txBody>
           </p:sp>
         </mc:Choice>
-        <mc:Fallback>
+        <mc:Fallback xmlns="">
           <p:sp>
             <p:nvSpPr>
               <p:cNvPr id="20" name="TextBox 19">
@@ -15320,8 +15320,8 @@
           </p:sp>
         </mc:Fallback>
       </mc:AlternateContent>
-      <mc:AlternateContent xmlns:mc="http://schemas.openxmlformats.org/markup-compatibility/2006">
-        <mc:Choice xmlns:a14="http://schemas.microsoft.com/office/drawing/2010/main" Requires="a14">
+      <mc:AlternateContent xmlns:mc="http://schemas.openxmlformats.org/markup-compatibility/2006" xmlns:a14="http://schemas.microsoft.com/office/drawing/2010/main">
+        <mc:Choice Requires="a14">
           <p:sp>
             <p:nvSpPr>
               <p:cNvPr id="3" name="TextBox 2">
@@ -15397,7 +15397,7 @@
             </p:txBody>
           </p:sp>
         </mc:Choice>
-        <mc:Fallback>
+        <mc:Fallback xmlns="">
           <p:sp>
             <p:nvSpPr>
               <p:cNvPr id="3" name="TextBox 2">
@@ -15442,8 +15442,8 @@
           </p:sp>
         </mc:Fallback>
       </mc:AlternateContent>
-      <mc:AlternateContent xmlns:mc="http://schemas.openxmlformats.org/markup-compatibility/2006">
-        <mc:Choice xmlns:a14="http://schemas.microsoft.com/office/drawing/2010/main" Requires="a14">
+      <mc:AlternateContent xmlns:mc="http://schemas.openxmlformats.org/markup-compatibility/2006" xmlns:a14="http://schemas.microsoft.com/office/drawing/2010/main">
+        <mc:Choice Requires="a14">
           <p:sp>
             <p:nvSpPr>
               <p:cNvPr id="22" name="TextBox 21">
@@ -15493,7 +15493,7 @@
             </p:txBody>
           </p:sp>
         </mc:Choice>
-        <mc:Fallback>
+        <mc:Fallback xmlns="">
           <p:sp>
             <p:nvSpPr>
               <p:cNvPr id="22" name="TextBox 21">
@@ -15538,8 +15538,8 @@
           </p:sp>
         </mc:Fallback>
       </mc:AlternateContent>
-      <mc:AlternateContent xmlns:mc="http://schemas.openxmlformats.org/markup-compatibility/2006">
-        <mc:Choice xmlns:a14="http://schemas.microsoft.com/office/drawing/2010/main" Requires="a14">
+      <mc:AlternateContent xmlns:mc="http://schemas.openxmlformats.org/markup-compatibility/2006" xmlns:a14="http://schemas.microsoft.com/office/drawing/2010/main">
+        <mc:Choice Requires="a14">
           <p:sp>
             <p:nvSpPr>
               <p:cNvPr id="23" name="TextBox 22">
@@ -15593,7 +15593,7 @@
             </p:txBody>
           </p:sp>
         </mc:Choice>
-        <mc:Fallback>
+        <mc:Fallback xmlns="">
           <p:sp>
             <p:nvSpPr>
               <p:cNvPr id="23" name="TextBox 22">
@@ -15638,8 +15638,8 @@
           </p:sp>
         </mc:Fallback>
       </mc:AlternateContent>
-      <mc:AlternateContent xmlns:mc="http://schemas.openxmlformats.org/markup-compatibility/2006">
-        <mc:Choice xmlns:a14="http://schemas.microsoft.com/office/drawing/2010/main" Requires="a14">
+      <mc:AlternateContent xmlns:mc="http://schemas.openxmlformats.org/markup-compatibility/2006" xmlns:a14="http://schemas.microsoft.com/office/drawing/2010/main">
+        <mc:Choice Requires="a14">
           <p:sp>
             <p:nvSpPr>
               <p:cNvPr id="2" name="TextBox 1">
@@ -15692,7 +15692,7 @@
             </p:txBody>
           </p:sp>
         </mc:Choice>
-        <mc:Fallback>
+        <mc:Fallback xmlns="">
           <p:sp>
             <p:nvSpPr>
               <p:cNvPr id="2" name="TextBox 1">
@@ -15737,8 +15737,8 @@
           </p:sp>
         </mc:Fallback>
       </mc:AlternateContent>
-      <mc:AlternateContent xmlns:mc="http://schemas.openxmlformats.org/markup-compatibility/2006">
-        <mc:Choice xmlns:a14="http://schemas.microsoft.com/office/drawing/2010/main" Requires="a14">
+      <mc:AlternateContent xmlns:mc="http://schemas.openxmlformats.org/markup-compatibility/2006" xmlns:a14="http://schemas.microsoft.com/office/drawing/2010/main">
+        <mc:Choice Requires="a14">
           <p:sp>
             <p:nvSpPr>
               <p:cNvPr id="13" name="TextBox 12">
@@ -15791,7 +15791,7 @@
             </p:txBody>
           </p:sp>
         </mc:Choice>
-        <mc:Fallback>
+        <mc:Fallback xmlns="">
           <p:sp>
             <p:nvSpPr>
               <p:cNvPr id="13" name="TextBox 12">
@@ -16598,8 +16598,8 @@
           </a:p>
         </p:txBody>
       </p:sp>
-      <mc:AlternateContent xmlns:mc="http://schemas.openxmlformats.org/markup-compatibility/2006">
-        <mc:Choice xmlns:a14="http://schemas.microsoft.com/office/drawing/2010/main" Requires="a14">
+      <mc:AlternateContent xmlns:mc="http://schemas.openxmlformats.org/markup-compatibility/2006" xmlns:a14="http://schemas.microsoft.com/office/drawing/2010/main">
+        <mc:Choice Requires="a14">
           <p:sp>
             <p:nvSpPr>
               <p:cNvPr id="6" name="TextBox 5">
@@ -16667,7 +16667,7 @@
             </p:txBody>
           </p:sp>
         </mc:Choice>
-        <mc:Fallback>
+        <mc:Fallback xmlns="">
           <p:sp>
             <p:nvSpPr>
               <p:cNvPr id="6" name="TextBox 5">
@@ -16814,8 +16814,8 @@
           </a:p>
         </p:txBody>
       </p:sp>
-      <mc:AlternateContent xmlns:mc="http://schemas.openxmlformats.org/markup-compatibility/2006">
-        <mc:Choice xmlns:a14="http://schemas.microsoft.com/office/drawing/2010/main" Requires="a14">
+      <mc:AlternateContent xmlns:mc="http://schemas.openxmlformats.org/markup-compatibility/2006" xmlns:a14="http://schemas.microsoft.com/office/drawing/2010/main">
+        <mc:Choice Requires="a14">
           <p:sp>
             <p:nvSpPr>
               <p:cNvPr id="9" name="TextBox 8">
@@ -16890,7 +16890,7 @@
             </p:txBody>
           </p:sp>
         </mc:Choice>
-        <mc:Fallback>
+        <mc:Fallback xmlns="">
           <p:sp>
             <p:nvSpPr>
               <p:cNvPr id="9" name="TextBox 8">
@@ -17037,8 +17037,8 @@
           </a:p>
         </p:txBody>
       </p:sp>
-      <mc:AlternateContent xmlns:mc="http://schemas.openxmlformats.org/markup-compatibility/2006">
-        <mc:Choice xmlns:a14="http://schemas.microsoft.com/office/drawing/2010/main" Requires="a14">
+      <mc:AlternateContent xmlns:mc="http://schemas.openxmlformats.org/markup-compatibility/2006" xmlns:a14="http://schemas.microsoft.com/office/drawing/2010/main">
+        <mc:Choice Requires="a14">
           <p:sp>
             <p:nvSpPr>
               <p:cNvPr id="12" name="TextBox 11">
@@ -17113,7 +17113,7 @@
             </p:txBody>
           </p:sp>
         </mc:Choice>
-        <mc:Fallback>
+        <mc:Fallback xmlns="">
           <p:sp>
             <p:nvSpPr>
               <p:cNvPr id="12" name="TextBox 11">
@@ -17319,8 +17319,8 @@
           </a:p>
         </p:txBody>
       </p:sp>
-      <mc:AlternateContent xmlns:mc="http://schemas.openxmlformats.org/markup-compatibility/2006">
-        <mc:Choice xmlns:a14="http://schemas.microsoft.com/office/drawing/2010/main" Requires="a14">
+      <mc:AlternateContent xmlns:mc="http://schemas.openxmlformats.org/markup-compatibility/2006" xmlns:a14="http://schemas.microsoft.com/office/drawing/2010/main">
+        <mc:Choice Requires="a14">
           <p:sp>
             <p:nvSpPr>
               <p:cNvPr id="19" name="TextBox 18">
@@ -17373,7 +17373,7 @@
             </p:txBody>
           </p:sp>
         </mc:Choice>
-        <mc:Fallback>
+        <mc:Fallback xmlns="">
           <p:sp>
             <p:nvSpPr>
               <p:cNvPr id="19" name="TextBox 18">
@@ -17418,8 +17418,8 @@
           </p:sp>
         </mc:Fallback>
       </mc:AlternateContent>
-      <mc:AlternateContent xmlns:mc="http://schemas.openxmlformats.org/markup-compatibility/2006">
-        <mc:Choice xmlns:a14="http://schemas.microsoft.com/office/drawing/2010/main" Requires="a14">
+      <mc:AlternateContent xmlns:mc="http://schemas.openxmlformats.org/markup-compatibility/2006" xmlns:a14="http://schemas.microsoft.com/office/drawing/2010/main">
+        <mc:Choice Requires="a14">
           <p:sp>
             <p:nvSpPr>
               <p:cNvPr id="20" name="TextBox 19">
@@ -17472,7 +17472,7 @@
             </p:txBody>
           </p:sp>
         </mc:Choice>
-        <mc:Fallback>
+        <mc:Fallback xmlns="">
           <p:sp>
             <p:nvSpPr>
               <p:cNvPr id="20" name="TextBox 19">
@@ -17517,8 +17517,8 @@
           </p:sp>
         </mc:Fallback>
       </mc:AlternateContent>
-      <mc:AlternateContent xmlns:mc="http://schemas.openxmlformats.org/markup-compatibility/2006">
-        <mc:Choice xmlns:a14="http://schemas.microsoft.com/office/drawing/2010/main" Requires="a14">
+      <mc:AlternateContent xmlns:mc="http://schemas.openxmlformats.org/markup-compatibility/2006" xmlns:a14="http://schemas.microsoft.com/office/drawing/2010/main">
+        <mc:Choice Requires="a14">
           <p:sp>
             <p:nvSpPr>
               <p:cNvPr id="3" name="TextBox 2">
@@ -17594,7 +17594,7 @@
             </p:txBody>
           </p:sp>
         </mc:Choice>
-        <mc:Fallback>
+        <mc:Fallback xmlns="">
           <p:sp>
             <p:nvSpPr>
               <p:cNvPr id="3" name="TextBox 2">
@@ -17639,8 +17639,8 @@
           </p:sp>
         </mc:Fallback>
       </mc:AlternateContent>
-      <mc:AlternateContent xmlns:mc="http://schemas.openxmlformats.org/markup-compatibility/2006">
-        <mc:Choice xmlns:a14="http://schemas.microsoft.com/office/drawing/2010/main" Requires="a14">
+      <mc:AlternateContent xmlns:mc="http://schemas.openxmlformats.org/markup-compatibility/2006" xmlns:a14="http://schemas.microsoft.com/office/drawing/2010/main">
+        <mc:Choice Requires="a14">
           <p:sp>
             <p:nvSpPr>
               <p:cNvPr id="22" name="TextBox 21">
@@ -17690,7 +17690,7 @@
             </p:txBody>
           </p:sp>
         </mc:Choice>
-        <mc:Fallback>
+        <mc:Fallback xmlns="">
           <p:sp>
             <p:nvSpPr>
               <p:cNvPr id="22" name="TextBox 21">
@@ -17735,8 +17735,8 @@
           </p:sp>
         </mc:Fallback>
       </mc:AlternateContent>
-      <mc:AlternateContent xmlns:mc="http://schemas.openxmlformats.org/markup-compatibility/2006">
-        <mc:Choice xmlns:a14="http://schemas.microsoft.com/office/drawing/2010/main" Requires="a14">
+      <mc:AlternateContent xmlns:mc="http://schemas.openxmlformats.org/markup-compatibility/2006" xmlns:a14="http://schemas.microsoft.com/office/drawing/2010/main">
+        <mc:Choice Requires="a14">
           <p:sp>
             <p:nvSpPr>
               <p:cNvPr id="15" name="TextBox 14">
@@ -17786,7 +17786,7 @@
             </p:txBody>
           </p:sp>
         </mc:Choice>
-        <mc:Fallback>
+        <mc:Fallback xmlns="">
           <p:sp>
             <p:nvSpPr>
               <p:cNvPr id="15" name="TextBox 14">
@@ -18552,8 +18552,8 @@
           </a:p>
         </p:txBody>
       </p:sp>
-      <mc:AlternateContent xmlns:mc="http://schemas.openxmlformats.org/markup-compatibility/2006">
-        <mc:Choice xmlns:a14="http://schemas.microsoft.com/office/drawing/2010/main" Requires="a14">
+      <mc:AlternateContent xmlns:mc="http://schemas.openxmlformats.org/markup-compatibility/2006" xmlns:a14="http://schemas.microsoft.com/office/drawing/2010/main">
+        <mc:Choice Requires="a14">
           <p:sp>
             <p:nvSpPr>
               <p:cNvPr id="6" name="TextBox 5">
@@ -18621,7 +18621,7 @@
             </p:txBody>
           </p:sp>
         </mc:Choice>
-        <mc:Fallback>
+        <mc:Fallback xmlns="">
           <p:sp>
             <p:nvSpPr>
               <p:cNvPr id="6" name="TextBox 5">
@@ -18768,8 +18768,8 @@
           </a:p>
         </p:txBody>
       </p:sp>
-      <mc:AlternateContent xmlns:mc="http://schemas.openxmlformats.org/markup-compatibility/2006">
-        <mc:Choice xmlns:a14="http://schemas.microsoft.com/office/drawing/2010/main" Requires="a14">
+      <mc:AlternateContent xmlns:mc="http://schemas.openxmlformats.org/markup-compatibility/2006" xmlns:a14="http://schemas.microsoft.com/office/drawing/2010/main">
+        <mc:Choice Requires="a14">
           <p:sp>
             <p:nvSpPr>
               <p:cNvPr id="9" name="TextBox 8">
@@ -18844,7 +18844,7 @@
             </p:txBody>
           </p:sp>
         </mc:Choice>
-        <mc:Fallback>
+        <mc:Fallback xmlns="">
           <p:sp>
             <p:nvSpPr>
               <p:cNvPr id="9" name="TextBox 8">
@@ -18991,8 +18991,8 @@
           </a:p>
         </p:txBody>
       </p:sp>
-      <mc:AlternateContent xmlns:mc="http://schemas.openxmlformats.org/markup-compatibility/2006">
-        <mc:Choice xmlns:a14="http://schemas.microsoft.com/office/drawing/2010/main" Requires="a14">
+      <mc:AlternateContent xmlns:mc="http://schemas.openxmlformats.org/markup-compatibility/2006" xmlns:a14="http://schemas.microsoft.com/office/drawing/2010/main">
+        <mc:Choice Requires="a14">
           <p:sp>
             <p:nvSpPr>
               <p:cNvPr id="12" name="TextBox 11">
@@ -19067,7 +19067,7 @@
             </p:txBody>
           </p:sp>
         </mc:Choice>
-        <mc:Fallback>
+        <mc:Fallback xmlns="">
           <p:sp>
             <p:nvSpPr>
               <p:cNvPr id="12" name="TextBox 11">
@@ -19410,8 +19410,8 @@
           </a:p>
         </p:txBody>
       </p:sp>
-      <mc:AlternateContent xmlns:mc="http://schemas.openxmlformats.org/markup-compatibility/2006">
-        <mc:Choice xmlns:a14="http://schemas.microsoft.com/office/drawing/2010/main" Requires="a14">
+      <mc:AlternateContent xmlns:mc="http://schemas.openxmlformats.org/markup-compatibility/2006" xmlns:a14="http://schemas.microsoft.com/office/drawing/2010/main">
+        <mc:Choice Requires="a14">
           <p:sp>
             <p:nvSpPr>
               <p:cNvPr id="93" name="TextBox 92">
@@ -19461,7 +19461,7 @@
             </p:txBody>
           </p:sp>
         </mc:Choice>
-        <mc:Fallback>
+        <mc:Fallback xmlns="">
           <p:sp>
             <p:nvSpPr>
               <p:cNvPr id="93" name="TextBox 92">
@@ -19506,8 +19506,8 @@
           </p:sp>
         </mc:Fallback>
       </mc:AlternateContent>
-      <mc:AlternateContent xmlns:mc="http://schemas.openxmlformats.org/markup-compatibility/2006">
-        <mc:Choice xmlns:a14="http://schemas.microsoft.com/office/drawing/2010/main" Requires="a14">
+      <mc:AlternateContent xmlns:mc="http://schemas.openxmlformats.org/markup-compatibility/2006" xmlns:a14="http://schemas.microsoft.com/office/drawing/2010/main">
+        <mc:Choice Requires="a14">
           <p:sp>
             <p:nvSpPr>
               <p:cNvPr id="94" name="TextBox 93">
@@ -19569,7 +19569,7 @@
             </p:txBody>
           </p:sp>
         </mc:Choice>
-        <mc:Fallback>
+        <mc:Fallback xmlns="">
           <p:sp>
             <p:nvSpPr>
               <p:cNvPr id="94" name="TextBox 93">
@@ -19614,8 +19614,8 @@
           </p:sp>
         </mc:Fallback>
       </mc:AlternateContent>
-      <mc:AlternateContent xmlns:mc="http://schemas.openxmlformats.org/markup-compatibility/2006">
-        <mc:Choice xmlns:a14="http://schemas.microsoft.com/office/drawing/2010/main" Requires="a14">
+      <mc:AlternateContent xmlns:mc="http://schemas.openxmlformats.org/markup-compatibility/2006" xmlns:a14="http://schemas.microsoft.com/office/drawing/2010/main">
+        <mc:Choice Requires="a14">
           <p:sp>
             <p:nvSpPr>
               <p:cNvPr id="95" name="TextBox 94">
@@ -19677,7 +19677,7 @@
             </p:txBody>
           </p:sp>
         </mc:Choice>
-        <mc:Fallback>
+        <mc:Fallback xmlns="">
           <p:sp>
             <p:nvSpPr>
               <p:cNvPr id="95" name="TextBox 94">
@@ -19722,8 +19722,8 @@
           </p:sp>
         </mc:Fallback>
       </mc:AlternateContent>
-      <mc:AlternateContent xmlns:mc="http://schemas.openxmlformats.org/markup-compatibility/2006">
-        <mc:Choice xmlns:a14="http://schemas.microsoft.com/office/drawing/2010/main" Requires="a14">
+      <mc:AlternateContent xmlns:mc="http://schemas.openxmlformats.org/markup-compatibility/2006" xmlns:a14="http://schemas.microsoft.com/office/drawing/2010/main">
+        <mc:Choice Requires="a14">
           <p:sp>
             <p:nvSpPr>
               <p:cNvPr id="96" name="TextBox 95">
@@ -19797,7 +19797,7 @@
             </p:txBody>
           </p:sp>
         </mc:Choice>
-        <mc:Fallback>
+        <mc:Fallback xmlns="">
           <p:sp>
             <p:nvSpPr>
               <p:cNvPr id="96" name="TextBox 95">
@@ -19842,8 +19842,8 @@
           </p:sp>
         </mc:Fallback>
       </mc:AlternateContent>
-      <mc:AlternateContent xmlns:mc="http://schemas.openxmlformats.org/markup-compatibility/2006">
-        <mc:Choice xmlns:a14="http://schemas.microsoft.com/office/drawing/2010/main" Requires="a14">
+      <mc:AlternateContent xmlns:mc="http://schemas.openxmlformats.org/markup-compatibility/2006" xmlns:a14="http://schemas.microsoft.com/office/drawing/2010/main">
+        <mc:Choice Requires="a14">
           <p:sp>
             <p:nvSpPr>
               <p:cNvPr id="97" name="TextBox 96">
@@ -19905,7 +19905,7 @@
             </p:txBody>
           </p:sp>
         </mc:Choice>
-        <mc:Fallback>
+        <mc:Fallback xmlns="">
           <p:sp>
             <p:nvSpPr>
               <p:cNvPr id="97" name="TextBox 96">
@@ -20336,8 +20336,8 @@
           </a:p>
         </p:txBody>
       </p:sp>
-      <mc:AlternateContent xmlns:mc="http://schemas.openxmlformats.org/markup-compatibility/2006">
-        <mc:Choice xmlns:a14="http://schemas.microsoft.com/office/drawing/2010/main" Requires="a14">
+      <mc:AlternateContent xmlns:mc="http://schemas.openxmlformats.org/markup-compatibility/2006" xmlns:a14="http://schemas.microsoft.com/office/drawing/2010/main">
+        <mc:Choice Requires="a14">
           <p:sp>
             <p:nvSpPr>
               <p:cNvPr id="148" name="TextBox 147">
@@ -20399,7 +20399,7 @@
             </p:txBody>
           </p:sp>
         </mc:Choice>
-        <mc:Fallback>
+        <mc:Fallback xmlns="">
           <p:sp>
             <p:nvSpPr>
               <p:cNvPr id="148" name="TextBox 147">
@@ -20444,8 +20444,8 @@
           </p:sp>
         </mc:Fallback>
       </mc:AlternateContent>
-      <mc:AlternateContent xmlns:mc="http://schemas.openxmlformats.org/markup-compatibility/2006">
-        <mc:Choice xmlns:a14="http://schemas.microsoft.com/office/drawing/2010/main" Requires="a14">
+      <mc:AlternateContent xmlns:mc="http://schemas.openxmlformats.org/markup-compatibility/2006" xmlns:a14="http://schemas.microsoft.com/office/drawing/2010/main">
+        <mc:Choice Requires="a14">
           <p:sp>
             <p:nvSpPr>
               <p:cNvPr id="149" name="TextBox 148">
@@ -20509,13 +20509,7 @@
                         <a:rPr lang="en-GB" sz="3200" b="0" i="1" smtClean="0">
                           <a:latin typeface="Cambria Math" panose="02040503050406030204" pitchFamily="18" charset="0"/>
                         </a:rPr>
-                        <m:t>2</m:t>
-                      </m:r>
-                      <m:r>
-                        <a:rPr lang="en-GB" sz="3200" b="0" i="1" smtClean="0">
-                          <a:latin typeface="Cambria Math" panose="02040503050406030204" pitchFamily="18" charset="0"/>
-                        </a:rPr>
-                        <m:t>=</m:t>
+                        <m:t>2=</m:t>
                       </m:r>
                     </m:oMath>
                   </m:oMathPara>
@@ -20525,7 +20519,7 @@
             </p:txBody>
           </p:sp>
         </mc:Choice>
-        <mc:Fallback>
+        <mc:Fallback xmlns="">
           <p:sp>
             <p:nvSpPr>
               <p:cNvPr id="149" name="TextBox 148">
@@ -20570,8 +20564,8 @@
           </p:sp>
         </mc:Fallback>
       </mc:AlternateContent>
-      <mc:AlternateContent xmlns:mc="http://schemas.openxmlformats.org/markup-compatibility/2006">
-        <mc:Choice xmlns:a14="http://schemas.microsoft.com/office/drawing/2010/main" Requires="a14">
+      <mc:AlternateContent xmlns:mc="http://schemas.openxmlformats.org/markup-compatibility/2006" xmlns:a14="http://schemas.microsoft.com/office/drawing/2010/main">
+        <mc:Choice Requires="a14">
           <p:sp>
             <p:nvSpPr>
               <p:cNvPr id="150" name="TextBox 149">
@@ -20645,7 +20639,7 @@
             </p:txBody>
           </p:sp>
         </mc:Choice>
-        <mc:Fallback>
+        <mc:Fallback xmlns="">
           <p:sp>
             <p:nvSpPr>
               <p:cNvPr id="150" name="TextBox 149">
@@ -20690,8 +20684,8 @@
           </p:sp>
         </mc:Fallback>
       </mc:AlternateContent>
-      <mc:AlternateContent xmlns:mc="http://schemas.openxmlformats.org/markup-compatibility/2006">
-        <mc:Choice xmlns:a14="http://schemas.microsoft.com/office/drawing/2010/main" Requires="a14">
+      <mc:AlternateContent xmlns:mc="http://schemas.openxmlformats.org/markup-compatibility/2006" xmlns:a14="http://schemas.microsoft.com/office/drawing/2010/main">
+        <mc:Choice Requires="a14">
           <p:sp>
             <p:nvSpPr>
               <p:cNvPr id="151" name="TextBox 150">
@@ -20764,7 +20758,7 @@
             </p:txBody>
           </p:sp>
         </mc:Choice>
-        <mc:Fallback>
+        <mc:Fallback xmlns="">
           <p:sp>
             <p:nvSpPr>
               <p:cNvPr id="151" name="TextBox 150">
@@ -20809,8 +20803,8 @@
           </p:sp>
         </mc:Fallback>
       </mc:AlternateContent>
-      <mc:AlternateContent xmlns:mc="http://schemas.openxmlformats.org/markup-compatibility/2006">
-        <mc:Choice xmlns:a14="http://schemas.microsoft.com/office/drawing/2010/main" Requires="a14">
+      <mc:AlternateContent xmlns:mc="http://schemas.openxmlformats.org/markup-compatibility/2006" xmlns:a14="http://schemas.microsoft.com/office/drawing/2010/main">
+        <mc:Choice Requires="a14">
           <p:sp>
             <p:nvSpPr>
               <p:cNvPr id="152" name="TextBox 151">
@@ -20884,7 +20878,7 @@
             </p:txBody>
           </p:sp>
         </mc:Choice>
-        <mc:Fallback>
+        <mc:Fallback xmlns="">
           <p:sp>
             <p:nvSpPr>
               <p:cNvPr id="152" name="TextBox 151">
@@ -32983,8 +32977,8 @@
           </a:p>
         </p:txBody>
       </p:sp>
-      <mc:AlternateContent xmlns:mc="http://schemas.openxmlformats.org/markup-compatibility/2006">
-        <mc:Choice xmlns:a14="http://schemas.microsoft.com/office/drawing/2010/main" Requires="a14">
+      <mc:AlternateContent xmlns:mc="http://schemas.openxmlformats.org/markup-compatibility/2006" xmlns:a14="http://schemas.microsoft.com/office/drawing/2010/main">
+        <mc:Choice Requires="a14">
           <p:sp>
             <p:nvSpPr>
               <p:cNvPr id="6" name="TextBox 5">
@@ -33046,6 +33040,7 @@
                             <a:solidFill>
                               <a:srgbClr val="FF0000"/>
                             </a:solidFill>
+                            <a:latin typeface="Cambria Math" panose="02040503050406030204" pitchFamily="18" charset="0"/>
                           </a:rPr>
                         </m:ctrlPr>
                       </m:sSupPr>
@@ -33055,6 +33050,7 @@
                             <a:solidFill>
                               <a:srgbClr val="FF0000"/>
                             </a:solidFill>
+                            <a:latin typeface="Cambria Math" panose="02040503050406030204" pitchFamily="18" charset="0"/>
                           </a:rPr>
                           <m:t>  </m:t>
                         </m:r>
@@ -33063,6 +33059,7 @@
                             <a:solidFill>
                               <a:srgbClr val="FF0000"/>
                             </a:solidFill>
+                            <a:latin typeface="Cambria Math" panose="02040503050406030204" pitchFamily="18" charset="0"/>
                           </a:rPr>
                           <m:t>𝟑</m:t>
                         </m:r>
@@ -33073,6 +33070,7 @@
                             <a:solidFill>
                               <a:srgbClr val="FF0000"/>
                             </a:solidFill>
+                            <a:latin typeface="Cambria Math" panose="02040503050406030204" pitchFamily="18" charset="0"/>
                           </a:rPr>
                           <m:t>𝟐</m:t>
                         </m:r>
@@ -33097,7 +33095,7 @@
             </p:txBody>
           </p:sp>
         </mc:Choice>
-        <mc:Fallback>
+        <mc:Fallback xmlns="">
           <p:sp>
             <p:nvSpPr>
               <p:cNvPr id="6" name="TextBox 5">
@@ -41187,8 +41185,8 @@
           </a:p>
         </p:txBody>
       </p:sp>
-      <mc:AlternateContent xmlns:mc="http://schemas.openxmlformats.org/markup-compatibility/2006">
-        <mc:Choice xmlns:a14="http://schemas.microsoft.com/office/drawing/2010/main" Requires="a14">
+      <mc:AlternateContent xmlns:mc="http://schemas.openxmlformats.org/markup-compatibility/2006" xmlns:a14="http://schemas.microsoft.com/office/drawing/2010/main">
+        <mc:Choice Requires="a14">
           <p:sp>
             <p:nvSpPr>
               <p:cNvPr id="9" name="TextBox 8">
@@ -41263,7 +41261,7 @@
             </p:txBody>
           </p:sp>
         </mc:Choice>
-        <mc:Fallback>
+        <mc:Fallback xmlns="">
           <p:sp>
             <p:nvSpPr>
               <p:cNvPr id="9" name="TextBox 8">
@@ -41410,8 +41408,8 @@
           </a:p>
         </p:txBody>
       </p:sp>
-      <mc:AlternateContent xmlns:mc="http://schemas.openxmlformats.org/markup-compatibility/2006">
-        <mc:Choice xmlns:a14="http://schemas.microsoft.com/office/drawing/2010/main" Requires="a14">
+      <mc:AlternateContent xmlns:mc="http://schemas.openxmlformats.org/markup-compatibility/2006" xmlns:a14="http://schemas.microsoft.com/office/drawing/2010/main">
+        <mc:Choice Requires="a14">
           <p:sp>
             <p:nvSpPr>
               <p:cNvPr id="12" name="TextBox 11">
@@ -41486,7 +41484,7 @@
             </p:txBody>
           </p:sp>
         </mc:Choice>
-        <mc:Fallback>
+        <mc:Fallback xmlns="">
           <p:sp>
             <p:nvSpPr>
               <p:cNvPr id="12" name="TextBox 11">
@@ -41531,8 +41529,8 @@
           </p:sp>
         </mc:Fallback>
       </mc:AlternateContent>
-      <mc:AlternateContent xmlns:mc="http://schemas.openxmlformats.org/markup-compatibility/2006">
-        <mc:Choice xmlns:a14="http://schemas.microsoft.com/office/drawing/2010/main" Requires="a14">
+      <mc:AlternateContent xmlns:mc="http://schemas.openxmlformats.org/markup-compatibility/2006" xmlns:a14="http://schemas.microsoft.com/office/drawing/2010/main">
+        <mc:Choice Requires="a14">
           <p:sp>
             <p:nvSpPr>
               <p:cNvPr id="13" name="TextBox 12">
@@ -41589,7 +41587,7 @@
             </p:txBody>
           </p:sp>
         </mc:Choice>
-        <mc:Fallback>
+        <mc:Fallback xmlns="">
           <p:sp>
             <p:nvSpPr>
               <p:cNvPr id="13" name="TextBox 12">
@@ -41634,8 +41632,8 @@
           </p:sp>
         </mc:Fallback>
       </mc:AlternateContent>
-      <mc:AlternateContent xmlns:mc="http://schemas.openxmlformats.org/markup-compatibility/2006">
-        <mc:Choice xmlns:a14="http://schemas.microsoft.com/office/drawing/2010/main" Requires="a14">
+      <mc:AlternateContent xmlns:mc="http://schemas.openxmlformats.org/markup-compatibility/2006" xmlns:a14="http://schemas.microsoft.com/office/drawing/2010/main">
+        <mc:Choice Requires="a14">
           <p:sp>
             <p:nvSpPr>
               <p:cNvPr id="14" name="TextBox 13">
@@ -41692,7 +41690,7 @@
             </p:txBody>
           </p:sp>
         </mc:Choice>
-        <mc:Fallback>
+        <mc:Fallback xmlns="">
           <p:sp>
             <p:nvSpPr>
               <p:cNvPr id="14" name="TextBox 13">
@@ -41737,8 +41735,8 @@
           </p:sp>
         </mc:Fallback>
       </mc:AlternateContent>
-      <mc:AlternateContent xmlns:mc="http://schemas.openxmlformats.org/markup-compatibility/2006">
-        <mc:Choice xmlns:a14="http://schemas.microsoft.com/office/drawing/2010/main" Requires="a14">
+      <mc:AlternateContent xmlns:mc="http://schemas.openxmlformats.org/markup-compatibility/2006" xmlns:a14="http://schemas.microsoft.com/office/drawing/2010/main">
+        <mc:Choice Requires="a14">
           <p:sp>
             <p:nvSpPr>
               <p:cNvPr id="15" name="TextBox 14">
@@ -41791,7 +41789,7 @@
             </p:txBody>
           </p:sp>
         </mc:Choice>
-        <mc:Fallback>
+        <mc:Fallback xmlns="">
           <p:sp>
             <p:nvSpPr>
               <p:cNvPr id="15" name="TextBox 14">

</xml_diff>